<commit_message>
REPORTGEN-210 : fix templates for generic table
</commit_message>
<xml_diff>
--- a/CastReporting.Reporting/TemplatesFiles/Generic Table Definition.pptx
+++ b/CastReporting.Reporting/TemplatesFiles/Generic Table Definition.pptx
@@ -137,6 +137,10 @@
 </p:presentation>
 </file>
 
+<file path=ppt/revisionInfo.xml><?xml version="1.0" encoding="utf-8"?>
+<p1510:revInfo xmlns:a="http://schemas.openxmlformats.org/drawingml/2006/main" xmlns:r="http://schemas.openxmlformats.org/officeDocument/2006/relationships" xmlns:p1510="http://schemas.microsoft.com/office/powerpoint/2015/10/main"/>
+</file>
+
 <file path=ppt/notesMasters/notesMaster1.xml><?xml version="1.0" encoding="utf-8"?>
 <p:notesMaster xmlns:a="http://schemas.openxmlformats.org/drawingml/2006/main" xmlns:r="http://schemas.openxmlformats.org/officeDocument/2006/relationships" xmlns:p="http://schemas.openxmlformats.org/presentationml/2006/main">
   <p:cSld>
@@ -219,7 +223,7 @@
           <a:p>
             <a:fld id="{BE7CF963-E58D-FC4D-BA9E-60A980752DC6}" type="datetimeFigureOut">
               <a:rPr lang="en-US" smtClean="0"/>
-              <a:t>3/28/2017</a:t>
+              <a:t>5/2/2017</a:t>
             </a:fld>
             <a:endParaRPr lang="en-US"/>
           </a:p>
@@ -876,7 +880,7 @@
           <a:p>
             <a:fld id="{B590C078-9131-4E49-8A0D-400FEE8377B5}" type="datetimeFigureOut">
               <a:rPr lang="en-US" smtClean="0"/>
-              <a:t>3/28/2017</a:t>
+              <a:t>5/2/2017</a:t>
             </a:fld>
             <a:endParaRPr lang="en-US"/>
           </a:p>
@@ -4461,7 +4465,7 @@
           <a:p>
             <a:fld id="{B590C078-9131-4E49-8A0D-400FEE8377B5}" type="datetimeFigureOut">
               <a:rPr lang="en-US" smtClean="0"/>
-              <a:t>3/28/2017</a:t>
+              <a:t>5/2/2017</a:t>
             </a:fld>
             <a:endParaRPr lang="en-US"/>
           </a:p>
@@ -8539,7 +8543,7 @@
           <a:p>
             <a:fld id="{B590C078-9131-4E49-8A0D-400FEE8377B5}" type="datetimeFigureOut">
               <a:rPr lang="en-US" smtClean="0"/>
-              <a:t>3/28/2017</a:t>
+              <a:t>5/2/2017</a:t>
             </a:fld>
             <a:endParaRPr lang="en-US"/>
           </a:p>
@@ -12364,7 +12368,7 @@
           <a:p>
             <a:fld id="{B590C078-9131-4E49-8A0D-400FEE8377B5}" type="datetimeFigureOut">
               <a:rPr lang="en-US" smtClean="0"/>
-              <a:t>3/28/2017</a:t>
+              <a:t>5/2/2017</a:t>
             </a:fld>
             <a:endParaRPr lang="en-US"/>
           </a:p>
@@ -14134,8 +14138,12 @@
               <a:t>VIOLATIONS</a:t>
             </a:r>
             <a:r>
+              <a:rPr lang="en-GB"/>
+              <a:t>: if </a:t>
+            </a:r>
+            <a:r>
               <a:rPr lang="en-GB" dirty="0"/>
-              <a:t>: f no information filled, then default value is "ALL"</a:t>
+              <a:t>no information filled, then default value is "ALL"</a:t>
             </a:r>
             <a:endParaRPr lang="en-US" dirty="0"/>
           </a:p>
@@ -16788,14 +16796,14 @@
           <a:p>
             <a:r>
               <a:rPr lang="en-GB" dirty="0"/>
-              <a:t>Simple table to get all Health Factors scores for current and previous snapshot</a:t>
+              <a:t>Simple table to get all Health Factors scores for current and previous snapshot with their evolution</a:t>
             </a:r>
             <a:endParaRPr lang="en-US" dirty="0"/>
           </a:p>
           <a:p>
             <a:r>
               <a:rPr lang="en-US" sz="1500" dirty="0"/>
-              <a:t>TABLE;GENERIC_TABLE;COL1=METRICS,ROW1=SNAPSHOTS,METRICS=HEALTH_FACTOR,SNAPSHOTS=CURRENT|PREVIOUS</a:t>
+              <a:t>TABLE;GENERIC_TABLE;COL1=METRICS,ROW1=SNAPSHOTS,METRICS=HEALTH_FACTOR,SNAPSHOTS=ALL</a:t>
             </a:r>
             <a:endParaRPr lang="en-US" dirty="0"/>
           </a:p>
@@ -17631,14 +17639,14 @@
           <p:nvPr>
             <p:extLst>
               <p:ext uri="{D42A27DB-BD31-4B8C-83A1-F6EECF244321}">
-                <p14:modId xmlns:p14="http://schemas.microsoft.com/office/powerpoint/2010/main" val="14219112"/>
+                <p14:modId xmlns:p14="http://schemas.microsoft.com/office/powerpoint/2010/main" val="2230846658"/>
               </p:ext>
             </p:extLst>
           </p:nvPr>
         </p:nvGraphicFramePr>
         <p:xfrm>
-          <a:off x="3441843" y="5689332"/>
-          <a:ext cx="7061590" cy="685800"/>
+          <a:off x="3441843" y="5470120"/>
+          <a:ext cx="7061590" cy="1143000"/>
         </p:xfrm>
         <a:graphic>
           <a:graphicData uri="http://schemas.openxmlformats.org/drawingml/2006/table">
@@ -18106,42 +18114,10 @@
                         </a:spcAft>
                       </a:pPr>
                       <a:r>
-                        <a:rPr lang="en-GB" sz="1000">
+                        <a:rPr lang="en-GB" sz="1000" dirty="0">
                           <a:effectLst/>
                         </a:rPr>
                         <a:t>Previous</a:t>
-                      </a:r>
-                      <a:endParaRPr lang="en-US" sz="1100">
-                        <a:effectLst/>
-                        <a:latin typeface="Calibri" panose="020F0502020204030204" pitchFamily="34" charset="0"/>
-                        <a:ea typeface="Calibri" panose="020F0502020204030204" pitchFamily="34" charset="0"/>
-                        <a:cs typeface="Times New Roman" panose="02020603050405020304" pitchFamily="18" charset="0"/>
-                      </a:endParaRPr>
-                    </a:p>
-                  </a:txBody>
-                  <a:tcPr marL="68580" marR="68580" marT="0" marB="0" anchor="ctr"/>
-                </a:tc>
-                <a:tc>
-                  <a:txBody>
-                    <a:bodyPr/>
-                    <a:lstStyle/>
-                    <a:p>
-                      <a:pPr marL="0" marR="0" algn="ctr">
-                        <a:lnSpc>
-                          <a:spcPct val="115000"/>
-                        </a:lnSpc>
-                        <a:spcBef>
-                          <a:spcPts val="0"/>
-                        </a:spcBef>
-                        <a:spcAft>
-                          <a:spcPts val="0"/>
-                        </a:spcAft>
-                      </a:pPr>
-                      <a:r>
-                        <a:rPr lang="en-GB" sz="1000" dirty="0">
-                          <a:effectLst/>
-                        </a:rPr>
-                        <a:t>score</a:t>
                       </a:r>
                       <a:endParaRPr lang="en-US" sz="1100" dirty="0">
                         <a:effectLst/>
@@ -18281,9 +18257,409 @@
                   </a:txBody>
                   <a:tcPr marL="68580" marR="68580" marT="0" marB="0" anchor="ctr"/>
                 </a:tc>
+                <a:tc>
+                  <a:txBody>
+                    <a:bodyPr/>
+                    <a:lstStyle/>
+                    <a:p>
+                      <a:pPr marL="0" marR="0" algn="ctr">
+                        <a:lnSpc>
+                          <a:spcPct val="115000"/>
+                        </a:lnSpc>
+                        <a:spcBef>
+                          <a:spcPts val="0"/>
+                        </a:spcBef>
+                        <a:spcAft>
+                          <a:spcPts val="0"/>
+                        </a:spcAft>
+                      </a:pPr>
+                      <a:r>
+                        <a:rPr lang="en-GB" sz="1000" dirty="0">
+                          <a:effectLst/>
+                        </a:rPr>
+                        <a:t>score</a:t>
+                      </a:r>
+                      <a:endParaRPr lang="en-US" sz="1100" dirty="0">
+                        <a:effectLst/>
+                        <a:latin typeface="Calibri" panose="020F0502020204030204" pitchFamily="34" charset="0"/>
+                        <a:ea typeface="Calibri" panose="020F0502020204030204" pitchFamily="34" charset="0"/>
+                        <a:cs typeface="Times New Roman" panose="02020603050405020304" pitchFamily="18" charset="0"/>
+                      </a:endParaRPr>
+                    </a:p>
+                  </a:txBody>
+                  <a:tcPr marL="68580" marR="68580" marT="0" marB="0" anchor="ctr"/>
+                </a:tc>
                 <a:extLst>
                   <a:ext uri="{0D108BD9-81ED-4DB2-BD59-A6C34878D82A}">
                     <a16:rowId xmlns:a16="http://schemas.microsoft.com/office/drawing/2014/main" val="3806502871"/>
+                  </a:ext>
+                </a:extLst>
+              </a:tr>
+              <a:tr h="228600">
+                <a:tc>
+                  <a:txBody>
+                    <a:bodyPr/>
+                    <a:lstStyle/>
+                    <a:p>
+                      <a:pPr marL="0" marR="0">
+                        <a:lnSpc>
+                          <a:spcPct val="115000"/>
+                        </a:lnSpc>
+                        <a:spcBef>
+                          <a:spcPts val="0"/>
+                        </a:spcBef>
+                        <a:spcAft>
+                          <a:spcPts val="0"/>
+                        </a:spcAft>
+                      </a:pPr>
+                      <a:r>
+                        <a:rPr lang="en-US" sz="1100" dirty="0">
+                          <a:effectLst/>
+                          <a:latin typeface="Calibri" panose="020F0502020204030204" pitchFamily="34" charset="0"/>
+                          <a:ea typeface="Calibri" panose="020F0502020204030204" pitchFamily="34" charset="0"/>
+                          <a:cs typeface="Times New Roman" panose="02020603050405020304" pitchFamily="18" charset="0"/>
+                        </a:rPr>
+                        <a:t>Evolution</a:t>
+                      </a:r>
+                    </a:p>
+                  </a:txBody>
+                  <a:tcPr marL="68580" marR="68580" marT="0" marB="0" anchor="ctr"/>
+                </a:tc>
+                <a:tc>
+                  <a:txBody>
+                    <a:bodyPr/>
+                    <a:lstStyle/>
+                    <a:p>
+                      <a:pPr marL="0" marR="0" algn="ctr">
+                        <a:lnSpc>
+                          <a:spcPct val="115000"/>
+                        </a:lnSpc>
+                        <a:spcBef>
+                          <a:spcPts val="0"/>
+                        </a:spcBef>
+                        <a:spcAft>
+                          <a:spcPts val="0"/>
+                        </a:spcAft>
+                      </a:pPr>
+                      <a:r>
+                        <a:rPr lang="en-US" sz="1100" dirty="0">
+                          <a:effectLst/>
+                          <a:latin typeface="Calibri" panose="020F0502020204030204" pitchFamily="34" charset="0"/>
+                          <a:ea typeface="Calibri" panose="020F0502020204030204" pitchFamily="34" charset="0"/>
+                          <a:cs typeface="Times New Roman" panose="02020603050405020304" pitchFamily="18" charset="0"/>
+                        </a:rPr>
+                        <a:t>Number</a:t>
+                      </a:r>
+                    </a:p>
+                  </a:txBody>
+                  <a:tcPr marL="68580" marR="68580" marT="0" marB="0" anchor="ctr"/>
+                </a:tc>
+                <a:tc>
+                  <a:txBody>
+                    <a:bodyPr/>
+                    <a:lstStyle/>
+                    <a:p>
+                      <a:pPr marL="0" marR="0" algn="ctr">
+                        <a:lnSpc>
+                          <a:spcPct val="115000"/>
+                        </a:lnSpc>
+                        <a:spcBef>
+                          <a:spcPts val="0"/>
+                        </a:spcBef>
+                        <a:spcAft>
+                          <a:spcPts val="0"/>
+                        </a:spcAft>
+                      </a:pPr>
+                      <a:r>
+                        <a:rPr lang="en-US" sz="1100" dirty="0">
+                          <a:effectLst/>
+                          <a:latin typeface="Calibri" panose="020F0502020204030204" pitchFamily="34" charset="0"/>
+                          <a:ea typeface="Calibri" panose="020F0502020204030204" pitchFamily="34" charset="0"/>
+                          <a:cs typeface="Times New Roman" panose="02020603050405020304" pitchFamily="18" charset="0"/>
+                        </a:rPr>
+                        <a:t>Number</a:t>
+                      </a:r>
+                    </a:p>
+                  </a:txBody>
+                  <a:tcPr marL="68580" marR="68580" marT="0" marB="0" anchor="ctr"/>
+                </a:tc>
+                <a:tc>
+                  <a:txBody>
+                    <a:bodyPr/>
+                    <a:lstStyle/>
+                    <a:p>
+                      <a:pPr marL="0" marR="0" algn="ctr">
+                        <a:lnSpc>
+                          <a:spcPct val="115000"/>
+                        </a:lnSpc>
+                        <a:spcBef>
+                          <a:spcPts val="0"/>
+                        </a:spcBef>
+                        <a:spcAft>
+                          <a:spcPts val="0"/>
+                        </a:spcAft>
+                      </a:pPr>
+                      <a:r>
+                        <a:rPr lang="en-US" sz="1100" dirty="0">
+                          <a:effectLst/>
+                          <a:latin typeface="Calibri" panose="020F0502020204030204" pitchFamily="34" charset="0"/>
+                          <a:ea typeface="Calibri" panose="020F0502020204030204" pitchFamily="34" charset="0"/>
+                          <a:cs typeface="Times New Roman" panose="02020603050405020304" pitchFamily="18" charset="0"/>
+                        </a:rPr>
+                        <a:t>Number</a:t>
+                      </a:r>
+                    </a:p>
+                  </a:txBody>
+                  <a:tcPr marL="68580" marR="68580" marT="0" marB="0" anchor="ctr"/>
+                </a:tc>
+                <a:tc>
+                  <a:txBody>
+                    <a:bodyPr/>
+                    <a:lstStyle/>
+                    <a:p>
+                      <a:pPr marL="0" marR="0" algn="ctr">
+                        <a:lnSpc>
+                          <a:spcPct val="115000"/>
+                        </a:lnSpc>
+                        <a:spcBef>
+                          <a:spcPts val="0"/>
+                        </a:spcBef>
+                        <a:spcAft>
+                          <a:spcPts val="0"/>
+                        </a:spcAft>
+                      </a:pPr>
+                      <a:r>
+                        <a:rPr lang="en-US" sz="1100" dirty="0">
+                          <a:effectLst/>
+                          <a:latin typeface="Calibri" panose="020F0502020204030204" pitchFamily="34" charset="0"/>
+                          <a:ea typeface="Calibri" panose="020F0502020204030204" pitchFamily="34" charset="0"/>
+                          <a:cs typeface="Times New Roman" panose="02020603050405020304" pitchFamily="18" charset="0"/>
+                        </a:rPr>
+                        <a:t>Number</a:t>
+                      </a:r>
+                    </a:p>
+                  </a:txBody>
+                  <a:tcPr marL="68580" marR="68580" marT="0" marB="0" anchor="ctr"/>
+                </a:tc>
+                <a:tc>
+                  <a:txBody>
+                    <a:bodyPr/>
+                    <a:lstStyle/>
+                    <a:p>
+                      <a:pPr marL="0" marR="0" algn="ctr">
+                        <a:lnSpc>
+                          <a:spcPct val="115000"/>
+                        </a:lnSpc>
+                        <a:spcBef>
+                          <a:spcPts val="0"/>
+                        </a:spcBef>
+                        <a:spcAft>
+                          <a:spcPts val="0"/>
+                        </a:spcAft>
+                      </a:pPr>
+                      <a:r>
+                        <a:rPr lang="en-US" sz="1100" dirty="0">
+                          <a:effectLst/>
+                          <a:latin typeface="Calibri" panose="020F0502020204030204" pitchFamily="34" charset="0"/>
+                          <a:ea typeface="Calibri" panose="020F0502020204030204" pitchFamily="34" charset="0"/>
+                          <a:cs typeface="Times New Roman" panose="02020603050405020304" pitchFamily="18" charset="0"/>
+                        </a:rPr>
+                        <a:t>Number</a:t>
+                      </a:r>
+                    </a:p>
+                  </a:txBody>
+                  <a:tcPr marL="68580" marR="68580" marT="0" marB="0" anchor="ctr"/>
+                </a:tc>
+                <a:extLst>
+                  <a:ext uri="{0D108BD9-81ED-4DB2-BD59-A6C34878D82A}">
+                    <a16:rowId xmlns:a16="http://schemas.microsoft.com/office/drawing/2014/main" val="3524752210"/>
+                  </a:ext>
+                </a:extLst>
+              </a:tr>
+              <a:tr h="228600">
+                <a:tc>
+                  <a:txBody>
+                    <a:bodyPr/>
+                    <a:lstStyle/>
+                    <a:p>
+                      <a:pPr marL="0" marR="0">
+                        <a:lnSpc>
+                          <a:spcPct val="115000"/>
+                        </a:lnSpc>
+                        <a:spcBef>
+                          <a:spcPts val="0"/>
+                        </a:spcBef>
+                        <a:spcAft>
+                          <a:spcPts val="0"/>
+                        </a:spcAft>
+                      </a:pPr>
+                      <a:r>
+                        <a:rPr lang="en-US" sz="1100">
+                          <a:effectLst/>
+                          <a:latin typeface="Calibri" panose="020F0502020204030204" pitchFamily="34" charset="0"/>
+                          <a:ea typeface="Calibri" panose="020F0502020204030204" pitchFamily="34" charset="0"/>
+                          <a:cs typeface="Times New Roman" panose="02020603050405020304" pitchFamily="18" charset="0"/>
+                        </a:rPr>
+                        <a:t>% Evolution</a:t>
+                      </a:r>
+                      <a:endParaRPr lang="en-US" sz="1100" dirty="0">
+                        <a:effectLst/>
+                        <a:latin typeface="Calibri" panose="020F0502020204030204" pitchFamily="34" charset="0"/>
+                        <a:ea typeface="Calibri" panose="020F0502020204030204" pitchFamily="34" charset="0"/>
+                        <a:cs typeface="Times New Roman" panose="02020603050405020304" pitchFamily="18" charset="0"/>
+                      </a:endParaRPr>
+                    </a:p>
+                  </a:txBody>
+                  <a:tcPr marL="68580" marR="68580" marT="0" marB="0" anchor="ctr"/>
+                </a:tc>
+                <a:tc>
+                  <a:txBody>
+                    <a:bodyPr/>
+                    <a:lstStyle/>
+                    <a:p>
+                      <a:pPr marL="0" marR="0" algn="ctr">
+                        <a:lnSpc>
+                          <a:spcPct val="115000"/>
+                        </a:lnSpc>
+                        <a:spcBef>
+                          <a:spcPts val="0"/>
+                        </a:spcBef>
+                        <a:spcAft>
+                          <a:spcPts val="0"/>
+                        </a:spcAft>
+                      </a:pPr>
+                      <a:r>
+                        <a:rPr lang="en-US" sz="1100" dirty="0">
+                          <a:effectLst/>
+                          <a:latin typeface="Calibri" panose="020F0502020204030204" pitchFamily="34" charset="0"/>
+                          <a:ea typeface="Calibri" panose="020F0502020204030204" pitchFamily="34" charset="0"/>
+                          <a:cs typeface="Times New Roman" panose="02020603050405020304" pitchFamily="18" charset="0"/>
+                        </a:rPr>
+                        <a:t>Percentage</a:t>
+                      </a:r>
+                    </a:p>
+                  </a:txBody>
+                  <a:tcPr marL="68580" marR="68580" marT="0" marB="0" anchor="ctr"/>
+                </a:tc>
+                <a:tc>
+                  <a:txBody>
+                    <a:bodyPr/>
+                    <a:lstStyle/>
+                    <a:p>
+                      <a:pPr marL="0" marR="0" algn="ctr">
+                        <a:lnSpc>
+                          <a:spcPct val="115000"/>
+                        </a:lnSpc>
+                        <a:spcBef>
+                          <a:spcPts val="0"/>
+                        </a:spcBef>
+                        <a:spcAft>
+                          <a:spcPts val="0"/>
+                        </a:spcAft>
+                      </a:pPr>
+                      <a:r>
+                        <a:rPr lang="en-US" sz="1100" dirty="0">
+                          <a:effectLst/>
+                          <a:latin typeface="Calibri" panose="020F0502020204030204" pitchFamily="34" charset="0"/>
+                          <a:ea typeface="Calibri" panose="020F0502020204030204" pitchFamily="34" charset="0"/>
+                          <a:cs typeface="Times New Roman" panose="02020603050405020304" pitchFamily="18" charset="0"/>
+                        </a:rPr>
+                        <a:t>Percentage</a:t>
+                      </a:r>
+                    </a:p>
+                  </a:txBody>
+                  <a:tcPr marL="68580" marR="68580" marT="0" marB="0" anchor="ctr"/>
+                </a:tc>
+                <a:tc>
+                  <a:txBody>
+                    <a:bodyPr/>
+                    <a:lstStyle/>
+                    <a:p>
+                      <a:pPr marL="0" marR="0" algn="ctr">
+                        <a:lnSpc>
+                          <a:spcPct val="115000"/>
+                        </a:lnSpc>
+                        <a:spcBef>
+                          <a:spcPts val="0"/>
+                        </a:spcBef>
+                        <a:spcAft>
+                          <a:spcPts val="0"/>
+                        </a:spcAft>
+                      </a:pPr>
+                      <a:r>
+                        <a:rPr lang="en-US" sz="1100" dirty="0">
+                          <a:effectLst/>
+                          <a:latin typeface="Calibri" panose="020F0502020204030204" pitchFamily="34" charset="0"/>
+                          <a:ea typeface="Calibri" panose="020F0502020204030204" pitchFamily="34" charset="0"/>
+                          <a:cs typeface="Times New Roman" panose="02020603050405020304" pitchFamily="18" charset="0"/>
+                        </a:rPr>
+                        <a:t>Percentage</a:t>
+                      </a:r>
+                    </a:p>
+                  </a:txBody>
+                  <a:tcPr marL="68580" marR="68580" marT="0" marB="0" anchor="ctr"/>
+                </a:tc>
+                <a:tc>
+                  <a:txBody>
+                    <a:bodyPr/>
+                    <a:lstStyle/>
+                    <a:p>
+                      <a:pPr marL="0" marR="0" algn="ctr">
+                        <a:lnSpc>
+                          <a:spcPct val="115000"/>
+                        </a:lnSpc>
+                        <a:spcBef>
+                          <a:spcPts val="0"/>
+                        </a:spcBef>
+                        <a:spcAft>
+                          <a:spcPts val="0"/>
+                        </a:spcAft>
+                      </a:pPr>
+                      <a:r>
+                        <a:rPr lang="en-US" sz="1100" dirty="0">
+                          <a:effectLst/>
+                          <a:latin typeface="Calibri" panose="020F0502020204030204" pitchFamily="34" charset="0"/>
+                          <a:ea typeface="Calibri" panose="020F0502020204030204" pitchFamily="34" charset="0"/>
+                          <a:cs typeface="Times New Roman" panose="02020603050405020304" pitchFamily="18" charset="0"/>
+                        </a:rPr>
+                        <a:t>Percentage</a:t>
+                      </a:r>
+                    </a:p>
+                  </a:txBody>
+                  <a:tcPr marL="68580" marR="68580" marT="0" marB="0" anchor="ctr"/>
+                </a:tc>
+                <a:tc>
+                  <a:txBody>
+                    <a:bodyPr/>
+                    <a:lstStyle/>
+                    <a:p>
+                      <a:pPr marL="0" marR="0" algn="ctr">
+                        <a:lnSpc>
+                          <a:spcPct val="115000"/>
+                        </a:lnSpc>
+                        <a:spcBef>
+                          <a:spcPts val="0"/>
+                        </a:spcBef>
+                        <a:spcAft>
+                          <a:spcPts val="0"/>
+                        </a:spcAft>
+                      </a:pPr>
+                      <a:r>
+                        <a:rPr lang="en-US" sz="1100" dirty="0">
+                          <a:effectLst/>
+                          <a:latin typeface="Calibri" panose="020F0502020204030204" pitchFamily="34" charset="0"/>
+                          <a:ea typeface="Calibri" panose="020F0502020204030204" pitchFamily="34" charset="0"/>
+                          <a:cs typeface="Times New Roman" panose="02020603050405020304" pitchFamily="18" charset="0"/>
+                        </a:rPr>
+                        <a:t>Percentage</a:t>
+                      </a:r>
+                    </a:p>
+                  </a:txBody>
+                  <a:tcPr marL="68580" marR="68580" marT="0" marB="0" anchor="ctr"/>
+                </a:tc>
+                <a:extLst>
+                  <a:ext uri="{0D108BD9-81ED-4DB2-BD59-A6C34878D82A}">
+                    <a16:rowId xmlns:a16="http://schemas.microsoft.com/office/drawing/2014/main" val="1438623678"/>
                   </a:ext>
                 </a:extLst>
               </a:tr>

</xml_diff>

<commit_message>
REPORTGEN-271 ReportGenerator Generic Table Definition.pptx displays wrong slide number
</commit_message>
<xml_diff>
--- a/CastReporting.Reporting/TemplatesFiles/Generic Table Definition.pptx
+++ b/CastReporting.Reporting/TemplatesFiles/Generic Table Definition.pptx
@@ -223,7 +223,7 @@
           <a:p>
             <a:fld id="{BE7CF963-E58D-FC4D-BA9E-60A980752DC6}" type="datetimeFigureOut">
               <a:rPr lang="en-US" smtClean="0"/>
-              <a:t>5/2/2017</a:t>
+              <a:t>6/23/2017</a:t>
             </a:fld>
             <a:endParaRPr lang="en-US"/>
           </a:p>
@@ -880,7 +880,7 @@
           <a:p>
             <a:fld id="{B590C078-9131-4E49-8A0D-400FEE8377B5}" type="datetimeFigureOut">
               <a:rPr lang="en-US" smtClean="0"/>
-              <a:t>5/2/2017</a:t>
+              <a:t>6/23/2017</a:t>
             </a:fld>
             <a:endParaRPr lang="en-US"/>
           </a:p>
@@ -4465,7 +4465,7 @@
           <a:p>
             <a:fld id="{B590C078-9131-4E49-8A0D-400FEE8377B5}" type="datetimeFigureOut">
               <a:rPr lang="en-US" smtClean="0"/>
-              <a:t>5/2/2017</a:t>
+              <a:t>6/23/2017</a:t>
             </a:fld>
             <a:endParaRPr lang="en-US"/>
           </a:p>
@@ -8543,7 +8543,7 @@
           <a:p>
             <a:fld id="{B590C078-9131-4E49-8A0D-400FEE8377B5}" type="datetimeFigureOut">
               <a:rPr lang="en-US" smtClean="0"/>
-              <a:t>5/2/2017</a:t>
+              <a:t>6/23/2017</a:t>
             </a:fld>
             <a:endParaRPr lang="en-US"/>
           </a:p>
@@ -12368,7 +12368,7 @@
           <a:p>
             <a:fld id="{B590C078-9131-4E49-8A0D-400FEE8377B5}" type="datetimeFigureOut">
               <a:rPr lang="en-US" smtClean="0"/>
-              <a:t>5/2/2017</a:t>
+              <a:t>6/23/2017</a:t>
             </a:fld>
             <a:endParaRPr lang="en-US"/>
           </a:p>
@@ -12979,7 +12979,7 @@
           <a:p>
             <a:r>
               <a:rPr lang="en-US" dirty="0"/>
-              <a:t>SAMPLE 9</a:t>
+              <a:t>SAMPLE 7</a:t>
             </a:r>
           </a:p>
         </p:txBody>
@@ -13429,7 +13429,7 @@
           <a:p>
             <a:r>
               <a:rPr lang="en-US" dirty="0"/>
-              <a:t>SAMPLE 10</a:t>
+              <a:t>SAMPLE 8</a:t>
             </a:r>
           </a:p>
         </p:txBody>
@@ -25621,7 +25621,7 @@
           <a:p>
             <a:r>
               <a:rPr lang="en-US" dirty="0"/>
-              <a:t>SAMPLE 8</a:t>
+              <a:t>SAMPLE 6</a:t>
             </a:r>
           </a:p>
         </p:txBody>

</xml_diff>

<commit_message>
REPORTGEN-271 : ReportGenerator Generic Table Definition.pptx displays wrong slide number
</commit_message>
<xml_diff>
--- a/CastReporting.Reporting/TemplatesFiles/Generic Table Definition.pptx
+++ b/CastReporting.Reporting/TemplatesFiles/Generic Table Definition.pptx
@@ -223,7 +223,7 @@
           <a:p>
             <a:fld id="{BE7CF963-E58D-FC4D-BA9E-60A980752DC6}" type="datetimeFigureOut">
               <a:rPr lang="en-US" smtClean="0"/>
-              <a:t>5/2/2017</a:t>
+              <a:t>7/4/2017</a:t>
             </a:fld>
             <a:endParaRPr lang="en-US"/>
           </a:p>
@@ -880,7 +880,7 @@
           <a:p>
             <a:fld id="{B590C078-9131-4E49-8A0D-400FEE8377B5}" type="datetimeFigureOut">
               <a:rPr lang="en-US" smtClean="0"/>
-              <a:t>5/2/2017</a:t>
+              <a:t>7/4/2017</a:t>
             </a:fld>
             <a:endParaRPr lang="en-US"/>
           </a:p>
@@ -4465,7 +4465,7 @@
           <a:p>
             <a:fld id="{B590C078-9131-4E49-8A0D-400FEE8377B5}" type="datetimeFigureOut">
               <a:rPr lang="en-US" smtClean="0"/>
-              <a:t>5/2/2017</a:t>
+              <a:t>7/4/2017</a:t>
             </a:fld>
             <a:endParaRPr lang="en-US"/>
           </a:p>
@@ -8543,7 +8543,7 @@
           <a:p>
             <a:fld id="{B590C078-9131-4E49-8A0D-400FEE8377B5}" type="datetimeFigureOut">
               <a:rPr lang="en-US" smtClean="0"/>
-              <a:t>5/2/2017</a:t>
+              <a:t>7/4/2017</a:t>
             </a:fld>
             <a:endParaRPr lang="en-US"/>
           </a:p>
@@ -12368,7 +12368,7 @@
           <a:p>
             <a:fld id="{B590C078-9131-4E49-8A0D-400FEE8377B5}" type="datetimeFigureOut">
               <a:rPr lang="en-US" smtClean="0"/>
-              <a:t>5/2/2017</a:t>
+              <a:t>7/4/2017</a:t>
             </a:fld>
             <a:endParaRPr lang="en-US"/>
           </a:p>
@@ -12979,7 +12979,7 @@
           <a:p>
             <a:r>
               <a:rPr lang="en-US" dirty="0"/>
-              <a:t>SAMPLE 9</a:t>
+              <a:t>SAMPLE 7</a:t>
             </a:r>
           </a:p>
         </p:txBody>
@@ -13428,9 +13428,10 @@
           <a:lstStyle/>
           <a:p>
             <a:r>
-              <a:rPr lang="en-US" dirty="0"/>
-              <a:t>SAMPLE 10</a:t>
-            </a:r>
+              <a:rPr lang="en-US"/>
+              <a:t>SAMPLE 8</a:t>
+            </a:r>
+            <a:endParaRPr lang="en-US" dirty="0"/>
           </a:p>
         </p:txBody>
       </p:sp>
@@ -25621,7 +25622,7 @@
           <a:p>
             <a:r>
               <a:rPr lang="en-US" dirty="0"/>
-              <a:t>SAMPLE 8</a:t>
+              <a:t>SAMPLE 6</a:t>
             </a:r>
           </a:p>
         </p:txBody>

</xml_diff>

<commit_message>
REPORTGEN-271 : fix typo in sample
</commit_message>
<xml_diff>
--- a/CastReporting.Reporting/TemplatesFiles/Generic Table Definition.pptx
+++ b/CastReporting.Reporting/TemplatesFiles/Generic Table Definition.pptx
@@ -223,7 +223,7 @@
           <a:p>
             <a:fld id="{BE7CF963-E58D-FC4D-BA9E-60A980752DC6}" type="datetimeFigureOut">
               <a:rPr lang="en-US" smtClean="0"/>
-              <a:t>7/4/2017</a:t>
+              <a:t>7/7/2017</a:t>
             </a:fld>
             <a:endParaRPr lang="en-US"/>
           </a:p>
@@ -880,7 +880,7 @@
           <a:p>
             <a:fld id="{B590C078-9131-4E49-8A0D-400FEE8377B5}" type="datetimeFigureOut">
               <a:rPr lang="en-US" smtClean="0"/>
-              <a:t>7/4/2017</a:t>
+              <a:t>7/7/2017</a:t>
             </a:fld>
             <a:endParaRPr lang="en-US"/>
           </a:p>
@@ -4465,7 +4465,7 @@
           <a:p>
             <a:fld id="{B590C078-9131-4E49-8A0D-400FEE8377B5}" type="datetimeFigureOut">
               <a:rPr lang="en-US" smtClean="0"/>
-              <a:t>7/4/2017</a:t>
+              <a:t>7/7/2017</a:t>
             </a:fld>
             <a:endParaRPr lang="en-US"/>
           </a:p>
@@ -8543,7 +8543,7 @@
           <a:p>
             <a:fld id="{B590C078-9131-4E49-8A0D-400FEE8377B5}" type="datetimeFigureOut">
               <a:rPr lang="en-US" smtClean="0"/>
-              <a:t>7/4/2017</a:t>
+              <a:t>7/7/2017</a:t>
             </a:fld>
             <a:endParaRPr lang="en-US"/>
           </a:p>
@@ -12368,7 +12368,7 @@
           <a:p>
             <a:fld id="{B590C078-9131-4E49-8A0D-400FEE8377B5}" type="datetimeFigureOut">
               <a:rPr lang="en-US" smtClean="0"/>
-              <a:t>7/4/2017</a:t>
+              <a:t>7/7/2017</a:t>
             </a:fld>
             <a:endParaRPr lang="en-US"/>
           </a:p>
@@ -16791,8 +16791,12 @@
           <a:lstStyle/>
           <a:p>
             <a:r>
+              <a:rPr lang="en-US"/>
+              <a:t>SAMPLE </a:t>
+            </a:r>
+            <a:r>
               <a:rPr lang="en-US" dirty="0"/>
-              <a:t>SAMPLES 1</a:t>
+              <a:t>1</a:t>
             </a:r>
           </a:p>
         </p:txBody>

</xml_diff>

<commit_message>
REPORTGEN-348: add explanation in template
</commit_message>
<xml_diff>
--- a/CastReporting.Reporting/TemplatesFiles/Generic Table Definition.pptx
+++ b/CastReporting.Reporting/TemplatesFiles/Generic Table Definition.pptx
@@ -15323,8 +15323,8 @@
         </p:nvSpPr>
         <p:spPr>
           <a:xfrm>
-            <a:off x="328706" y="1333500"/>
-            <a:ext cx="11253694" cy="4351338"/>
+            <a:off x="328706" y="1333499"/>
+            <a:ext cx="11253694" cy="4790524"/>
           </a:xfrm>
         </p:spPr>
         <p:txBody>
@@ -15423,6 +15423,23 @@
               </a:rPr>
               <a:t>CRITICAL_VIOLATIONS</a:t>
             </a:r>
+          </a:p>
+          <a:p>
+            <a:r>
+              <a:rPr lang="fr-FR" dirty="0">
+                <a:solidFill>
+                  <a:srgbClr val="00B050"/>
+                </a:solidFill>
+              </a:rPr>
+              <a:t>TECHNOLOGIES</a:t>
+            </a:r>
+          </a:p>
+          <a:p>
+            <a:endParaRPr lang="fr-FR" dirty="0">
+              <a:solidFill>
+                <a:schemeClr val="accent1"/>
+              </a:solidFill>
+            </a:endParaRPr>
           </a:p>
         </p:txBody>
       </p:sp>
@@ -16991,7 +17008,7 @@
         </p:nvSpPr>
         <p:spPr>
           <a:xfrm>
-            <a:off x="586501" y="5828677"/>
+            <a:off x="258603" y="6124023"/>
             <a:ext cx="10703859" cy="447383"/>
           </a:xfrm>
           <a:prstGeom prst="rect">
@@ -17033,6 +17050,62 @@
             <a:r>
               <a:rPr lang="en-GB" dirty="0"/>
               <a:t> will be empty.</a:t>
+            </a:r>
+            <a:endParaRPr lang="en-US" dirty="0"/>
+          </a:p>
+        </p:txBody>
+      </p:sp>
+      <p:sp>
+        <p:nvSpPr>
+          <p:cNvPr id="49" name="Rectangle: Rounded Corners 48">
+            <a:extLst>
+              <a:ext uri="{FF2B5EF4-FFF2-40B4-BE49-F238E27FC236}">
+                <a16:creationId xmlns:a16="http://schemas.microsoft.com/office/drawing/2014/main" id="{D419384A-34D2-4C30-AAEF-C0BE95F66CBB}"/>
+              </a:ext>
+            </a:extLst>
+          </p:cNvPr>
+          <p:cNvSpPr/>
+          <p:nvPr/>
+        </p:nvSpPr>
+        <p:spPr>
+          <a:xfrm>
+            <a:off x="3509445" y="5607709"/>
+            <a:ext cx="1580670" cy="322080"/>
+          </a:xfrm>
+          <a:prstGeom prst="roundRect">
+            <a:avLst/>
+          </a:prstGeom>
+          <a:solidFill>
+            <a:srgbClr val="00B050"/>
+          </a:solidFill>
+          <a:ln>
+            <a:noFill/>
+          </a:ln>
+        </p:spPr>
+        <p:style>
+          <a:lnRef idx="2">
+            <a:schemeClr val="accent1">
+              <a:shade val="50000"/>
+            </a:schemeClr>
+          </a:lnRef>
+          <a:fillRef idx="1">
+            <a:schemeClr val="accent1"/>
+          </a:fillRef>
+          <a:effectRef idx="0">
+            <a:schemeClr val="accent1"/>
+          </a:effectRef>
+          <a:fontRef idx="minor">
+            <a:schemeClr val="lt1"/>
+          </a:fontRef>
+        </p:style>
+        <p:txBody>
+          <a:bodyPr rtlCol="0" anchor="ctr"/>
+          <a:lstStyle/>
+          <a:p>
+            <a:pPr algn="ctr"/>
+            <a:r>
+              <a:rPr lang="en-US" sz="1200" dirty="0"/>
+              <a:t>&lt;EXPRESSIONS&gt;</a:t>
             </a:r>
             <a:endParaRPr lang="en-US" dirty="0"/>
           </a:p>
@@ -17102,23 +17175,19 @@
         </p:nvSpPr>
         <p:spPr>
           <a:xfrm>
-            <a:off x="642730" y="1333500"/>
+            <a:off x="626165" y="1045401"/>
             <a:ext cx="10939670" cy="2480469"/>
           </a:xfrm>
         </p:spPr>
         <p:txBody>
           <a:bodyPr>
-            <a:normAutofit fontScale="77500" lnSpcReduction="20000"/>
+            <a:normAutofit fontScale="62500" lnSpcReduction="20000"/>
           </a:bodyPr>
           <a:lstStyle/>
           <a:p>
             <a:r>
-              <a:rPr lang="en-GB"/>
-              <a:t>COL 1: </a:t>
-            </a:r>
-            <a:r>
               <a:rPr lang="en-GB" dirty="0"/>
-              <a:t>1</a:t>
+              <a:t>COL 1: 1</a:t>
             </a:r>
             <a:r>
               <a:rPr lang="en-GB" baseline="30000" dirty="0"/>
@@ -17396,6 +17465,17 @@
               <a:rPr lang="en-US" dirty="0"/>
               <a:t>and “a”, “b”, “c”, “d” and “e” are values from selected axis.</a:t>
             </a:r>
+            <a:br>
+              <a:rPr lang="en-US" dirty="0"/>
+            </a:br>
+            <a:r>
+              <a:rPr lang="en-GB" dirty="0"/>
+              <a:t>For Custom expressions axis, the CUSTOM_EXPRESSIONS parameter can contains a list of custom expressions separated by ‘|’, and supplementary options are needed : PARAMS (mandatory) contains the list of parameters of the custom expression, FORMAT (optional) contains the format of the result, and of course, the parameters definition (see sample 10).</a:t>
+            </a:r>
+            <a:endParaRPr lang="en-US" dirty="0"/>
+          </a:p>
+          <a:p>
+            <a:endParaRPr lang="en-US" dirty="0"/>
           </a:p>
           <a:p>
             <a:pPr marL="0" indent="0">

</xml_diff>